<commit_message>
updated with multi variant analysis
</commit_message>
<xml_diff>
--- a/Lending_Club_Case_Study.pptx
+++ b/Lending_Club_Case_Study.pptx
@@ -28,10 +28,13 @@
     <p:sldId id="274" r:id="rId25"/>
     <p:sldId id="275" r:id="rId26"/>
     <p:sldId id="276" r:id="rId27"/>
-    <p:sldId id="277" r:id="rId28"/>
-    <p:sldId id="283" r:id="rId29"/>
-    <p:sldId id="285" r:id="rId30"/>
-    <p:sldId id="284" r:id="rId31"/>
+    <p:sldId id="286" r:id="rId28"/>
+    <p:sldId id="287" r:id="rId29"/>
+    <p:sldId id="288" r:id="rId30"/>
+    <p:sldId id="277" r:id="rId31"/>
+    <p:sldId id="283" r:id="rId32"/>
+    <p:sldId id="285" r:id="rId33"/>
+    <p:sldId id="284" r:id="rId34"/>
   </p:sldIdLst>
   <p:sldSz cx="12192000" cy="6858000"/>
   <p:notesSz cx="6858000" cy="9144000"/>
@@ -143,7 +146,7 @@
   <pc:docChgLst>
     <pc:chgData name="Sivananda Reddy" userId="48babcc6619d37c7" providerId="LiveId" clId="{AC41EE55-AD9A-4D1C-9B7C-07B2E9EA8215}"/>
     <pc:docChg chg="undo redo custSel addSld delSld modSld sldOrd">
-      <pc:chgData name="Sivananda Reddy" userId="48babcc6619d37c7" providerId="LiveId" clId="{AC41EE55-AD9A-4D1C-9B7C-07B2E9EA8215}" dt="2024-05-20T07:53:13.532" v="2583" actId="20577"/>
+      <pc:chgData name="Sivananda Reddy" userId="48babcc6619d37c7" providerId="LiveId" clId="{AC41EE55-AD9A-4D1C-9B7C-07B2E9EA8215}" dt="2024-05-20T09:01:38.407" v="2671" actId="20577"/>
       <pc:docMkLst>
         <pc:docMk/>
       </pc:docMkLst>
@@ -210,7 +213,7 @@
         </pc:spChg>
       </pc:sldChg>
       <pc:sldChg chg="addSp modSp mod">
-        <pc:chgData name="Sivananda Reddy" userId="48babcc6619d37c7" providerId="LiveId" clId="{AC41EE55-AD9A-4D1C-9B7C-07B2E9EA8215}" dt="2024-05-20T07:05:09.026" v="2364" actId="113"/>
+        <pc:chgData name="Sivananda Reddy" userId="48babcc6619d37c7" providerId="LiveId" clId="{AC41EE55-AD9A-4D1C-9B7C-07B2E9EA8215}" dt="2024-05-20T09:01:38.407" v="2671" actId="20577"/>
         <pc:sldMkLst>
           <pc:docMk/>
           <pc:sldMk cId="1396154371" sldId="260"/>
@@ -224,7 +227,7 @@
           </ac:spMkLst>
         </pc:spChg>
         <pc:spChg chg="mod">
-          <ac:chgData name="Sivananda Reddy" userId="48babcc6619d37c7" providerId="LiveId" clId="{AC41EE55-AD9A-4D1C-9B7C-07B2E9EA8215}" dt="2024-05-20T07:00:43.634" v="2243" actId="1035"/>
+          <ac:chgData name="Sivananda Reddy" userId="48babcc6619d37c7" providerId="LiveId" clId="{AC41EE55-AD9A-4D1C-9B7C-07B2E9EA8215}" dt="2024-05-20T08:57:48.254" v="2636" actId="20577"/>
           <ac:spMkLst>
             <pc:docMk/>
             <pc:sldMk cId="1396154371" sldId="260"/>
@@ -248,7 +251,7 @@
           </ac:spMkLst>
         </pc:spChg>
         <pc:spChg chg="mod">
-          <ac:chgData name="Sivananda Reddy" userId="48babcc6619d37c7" providerId="LiveId" clId="{AC41EE55-AD9A-4D1C-9B7C-07B2E9EA8215}" dt="2024-05-20T06:56:04.534" v="2180" actId="20577"/>
+          <ac:chgData name="Sivananda Reddy" userId="48babcc6619d37c7" providerId="LiveId" clId="{AC41EE55-AD9A-4D1C-9B7C-07B2E9EA8215}" dt="2024-05-20T09:01:38.407" v="2671" actId="20577"/>
           <ac:spMkLst>
             <pc:docMk/>
             <pc:sldMk cId="1396154371" sldId="260"/>
@@ -630,13 +633,13 @@
         </pc:spChg>
       </pc:sldChg>
       <pc:sldChg chg="modSp new mod">
-        <pc:chgData name="Sivananda Reddy" userId="48babcc6619d37c7" providerId="LiveId" clId="{AC41EE55-AD9A-4D1C-9B7C-07B2E9EA8215}" dt="2024-05-20T05:48:55.496" v="1541" actId="115"/>
+        <pc:chgData name="Sivananda Reddy" userId="48babcc6619d37c7" providerId="LiveId" clId="{AC41EE55-AD9A-4D1C-9B7C-07B2E9EA8215}" dt="2024-05-20T09:01:30.144" v="2661" actId="20577"/>
         <pc:sldMkLst>
           <pc:docMk/>
           <pc:sldMk cId="528204275" sldId="283"/>
         </pc:sldMkLst>
         <pc:spChg chg="mod">
-          <ac:chgData name="Sivananda Reddy" userId="48babcc6619d37c7" providerId="LiveId" clId="{AC41EE55-AD9A-4D1C-9B7C-07B2E9EA8215}" dt="2024-05-20T03:43:16.234" v="1300" actId="20577"/>
+          <ac:chgData name="Sivananda Reddy" userId="48babcc6619d37c7" providerId="LiveId" clId="{AC41EE55-AD9A-4D1C-9B7C-07B2E9EA8215}" dt="2024-05-20T09:01:30.144" v="2661" actId="20577"/>
           <ac:spMkLst>
             <pc:docMk/>
             <pc:sldMk cId="528204275" sldId="283"/>
@@ -816,6 +819,131 @@
             <ac:graphicFrameMk id="4" creationId="{B22845B1-978E-78EB-56CD-978FC763C5A6}"/>
           </ac:graphicFrameMkLst>
         </pc:graphicFrameChg>
+      </pc:sldChg>
+      <pc:sldChg chg="addSp delSp modSp add mod">
+        <pc:chgData name="Sivananda Reddy" userId="48babcc6619d37c7" providerId="LiveId" clId="{AC41EE55-AD9A-4D1C-9B7C-07B2E9EA8215}" dt="2024-05-20T08:45:17.298" v="2614" actId="1076"/>
+        <pc:sldMkLst>
+          <pc:docMk/>
+          <pc:sldMk cId="1790691168" sldId="286"/>
+        </pc:sldMkLst>
+        <pc:spChg chg="mod">
+          <ac:chgData name="Sivananda Reddy" userId="48babcc6619d37c7" providerId="LiveId" clId="{AC41EE55-AD9A-4D1C-9B7C-07B2E9EA8215}" dt="2024-05-20T08:41:37.486" v="2590" actId="6549"/>
+          <ac:spMkLst>
+            <pc:docMk/>
+            <pc:sldMk cId="1790691168" sldId="286"/>
+            <ac:spMk id="2" creationId="{2EE5D0EA-2C09-70ED-DCB2-166E0AA65174}"/>
+          </ac:spMkLst>
+        </pc:spChg>
+        <pc:spChg chg="del">
+          <ac:chgData name="Sivananda Reddy" userId="48babcc6619d37c7" providerId="LiveId" clId="{AC41EE55-AD9A-4D1C-9B7C-07B2E9EA8215}" dt="2024-05-20T08:45:06.213" v="2610" actId="478"/>
+          <ac:spMkLst>
+            <pc:docMk/>
+            <pc:sldMk cId="1790691168" sldId="286"/>
+            <ac:spMk id="3" creationId="{CAAFB202-823E-0439-3FC4-58B1986FC475}"/>
+          </ac:spMkLst>
+        </pc:spChg>
+        <pc:picChg chg="del">
+          <ac:chgData name="Sivananda Reddy" userId="48babcc6619d37c7" providerId="LiveId" clId="{AC41EE55-AD9A-4D1C-9B7C-07B2E9EA8215}" dt="2024-05-20T08:42:20.133" v="2591" actId="478"/>
+          <ac:picMkLst>
+            <pc:docMk/>
+            <pc:sldMk cId="1790691168" sldId="286"/>
+            <ac:picMk id="10242" creationId="{F7C8982A-87FB-3E7C-3D02-DC65D3479A25}"/>
+          </ac:picMkLst>
+        </pc:picChg>
+        <pc:picChg chg="del">
+          <ac:chgData name="Sivananda Reddy" userId="48babcc6619d37c7" providerId="LiveId" clId="{AC41EE55-AD9A-4D1C-9B7C-07B2E9EA8215}" dt="2024-05-20T08:45:01.811" v="2609" actId="478"/>
+          <ac:picMkLst>
+            <pc:docMk/>
+            <pc:sldMk cId="1790691168" sldId="286"/>
+            <ac:picMk id="10244" creationId="{2DEB6DF2-B402-BE8B-1B64-573C3C231145}"/>
+          </ac:picMkLst>
+        </pc:picChg>
+        <pc:picChg chg="add mod">
+          <ac:chgData name="Sivananda Reddy" userId="48babcc6619d37c7" providerId="LiveId" clId="{AC41EE55-AD9A-4D1C-9B7C-07B2E9EA8215}" dt="2024-05-20T08:45:17.298" v="2614" actId="1076"/>
+          <ac:picMkLst>
+            <pc:docMk/>
+            <pc:sldMk cId="1790691168" sldId="286"/>
+            <ac:picMk id="16386" creationId="{5F79C304-2358-79BD-F9BC-23454620F7FE}"/>
+          </ac:picMkLst>
+        </pc:picChg>
+      </pc:sldChg>
+      <pc:sldChg chg="addSp delSp modSp add mod">
+        <pc:chgData name="Sivananda Reddy" userId="48babcc6619d37c7" providerId="LiveId" clId="{AC41EE55-AD9A-4D1C-9B7C-07B2E9EA8215}" dt="2024-05-20T09:00:13.406" v="2650"/>
+        <pc:sldMkLst>
+          <pc:docMk/>
+          <pc:sldMk cId="4194310291" sldId="287"/>
+        </pc:sldMkLst>
+        <pc:spChg chg="mod">
+          <ac:chgData name="Sivananda Reddy" userId="48babcc6619d37c7" providerId="LiveId" clId="{AC41EE55-AD9A-4D1C-9B7C-07B2E9EA8215}" dt="2024-05-20T09:00:13.406" v="2650"/>
+          <ac:spMkLst>
+            <pc:docMk/>
+            <pc:sldMk cId="4194310291" sldId="287"/>
+            <ac:spMk id="2" creationId="{2EE5D0EA-2C09-70ED-DCB2-166E0AA65174}"/>
+          </ac:spMkLst>
+        </pc:spChg>
+        <pc:spChg chg="del">
+          <ac:chgData name="Sivananda Reddy" userId="48babcc6619d37c7" providerId="LiveId" clId="{AC41EE55-AD9A-4D1C-9B7C-07B2E9EA8215}" dt="2024-05-20T08:43:12.008" v="2601" actId="478"/>
+          <ac:spMkLst>
+            <pc:docMk/>
+            <pc:sldMk cId="4194310291" sldId="287"/>
+            <ac:spMk id="3" creationId="{CAAFB202-823E-0439-3FC4-58B1986FC475}"/>
+          </ac:spMkLst>
+        </pc:spChg>
+        <pc:picChg chg="del">
+          <ac:chgData name="Sivananda Reddy" userId="48babcc6619d37c7" providerId="LiveId" clId="{AC41EE55-AD9A-4D1C-9B7C-07B2E9EA8215}" dt="2024-05-20T08:42:45.673" v="2593" actId="478"/>
+          <ac:picMkLst>
+            <pc:docMk/>
+            <pc:sldMk cId="4194310291" sldId="287"/>
+            <ac:picMk id="10242" creationId="{F7C8982A-87FB-3E7C-3D02-DC65D3479A25}"/>
+          </ac:picMkLst>
+        </pc:picChg>
+        <pc:picChg chg="del">
+          <ac:chgData name="Sivananda Reddy" userId="48babcc6619d37c7" providerId="LiveId" clId="{AC41EE55-AD9A-4D1C-9B7C-07B2E9EA8215}" dt="2024-05-20T08:42:58.205" v="2598" actId="478"/>
+          <ac:picMkLst>
+            <pc:docMk/>
+            <pc:sldMk cId="4194310291" sldId="287"/>
+            <ac:picMk id="10244" creationId="{2DEB6DF2-B402-BE8B-1B64-573C3C231145}"/>
+          </ac:picMkLst>
+        </pc:picChg>
+        <pc:picChg chg="add mod">
+          <ac:chgData name="Sivananda Reddy" userId="48babcc6619d37c7" providerId="LiveId" clId="{AC41EE55-AD9A-4D1C-9B7C-07B2E9EA8215}" dt="2024-05-20T08:43:06.834" v="2600" actId="1076"/>
+          <ac:picMkLst>
+            <pc:docMk/>
+            <pc:sldMk cId="4194310291" sldId="287"/>
+            <ac:picMk id="15362" creationId="{AD1D7184-BC94-1E19-97DF-FC9E5D50AE58}"/>
+          </ac:picMkLst>
+        </pc:picChg>
+      </pc:sldChg>
+      <pc:sldChg chg="addSp delSp modSp add mod">
+        <pc:chgData name="Sivananda Reddy" userId="48babcc6619d37c7" providerId="LiveId" clId="{AC41EE55-AD9A-4D1C-9B7C-07B2E9EA8215}" dt="2024-05-20T09:00:16.817" v="2651"/>
+        <pc:sldMkLst>
+          <pc:docMk/>
+          <pc:sldMk cId="3222858783" sldId="288"/>
+        </pc:sldMkLst>
+        <pc:spChg chg="mod">
+          <ac:chgData name="Sivananda Reddy" userId="48babcc6619d37c7" providerId="LiveId" clId="{AC41EE55-AD9A-4D1C-9B7C-07B2E9EA8215}" dt="2024-05-20T09:00:16.817" v="2651"/>
+          <ac:spMkLst>
+            <pc:docMk/>
+            <pc:sldMk cId="3222858783" sldId="288"/>
+            <ac:spMk id="2" creationId="{2EE5D0EA-2C09-70ED-DCB2-166E0AA65174}"/>
+          </ac:spMkLst>
+        </pc:spChg>
+        <pc:picChg chg="del">
+          <ac:chgData name="Sivananda Reddy" userId="48babcc6619d37c7" providerId="LiveId" clId="{AC41EE55-AD9A-4D1C-9B7C-07B2E9EA8215}" dt="2024-05-20T08:43:39.066" v="2603" actId="478"/>
+          <ac:picMkLst>
+            <pc:docMk/>
+            <pc:sldMk cId="3222858783" sldId="288"/>
+            <ac:picMk id="15362" creationId="{AD1D7184-BC94-1E19-97DF-FC9E5D50AE58}"/>
+          </ac:picMkLst>
+        </pc:picChg>
+        <pc:picChg chg="add mod">
+          <ac:chgData name="Sivananda Reddy" userId="48babcc6619d37c7" providerId="LiveId" clId="{AC41EE55-AD9A-4D1C-9B7C-07B2E9EA8215}" dt="2024-05-20T08:43:53.934" v="2608" actId="1076"/>
+          <ac:picMkLst>
+            <pc:docMk/>
+            <pc:sldMk cId="3222858783" sldId="288"/>
+            <ac:picMk id="18434" creationId="{8CEF3D4B-2567-4FEF-6B9E-247B188324E3}"/>
+          </ac:picMkLst>
+        </pc:picChg>
       </pc:sldChg>
     </pc:docChg>
   </pc:docChgLst>
@@ -10611,6 +10739,333 @@
                   <a:srgbClr val="0070C0"/>
                 </a:solidFill>
               </a:rPr>
+              <a:t>Multivariant Analysis</a:t>
+            </a:r>
+          </a:p>
+        </p:txBody>
+      </p:sp>
+      <p:pic>
+        <p:nvPicPr>
+          <p:cNvPr id="16386" name="Picture 2">
+            <a:extLst>
+              <a:ext uri="{FF2B5EF4-FFF2-40B4-BE49-F238E27FC236}">
+                <a16:creationId xmlns:a16="http://schemas.microsoft.com/office/drawing/2014/main" id="{5F79C304-2358-79BD-F9BC-23454620F7FE}"/>
+              </a:ext>
+            </a:extLst>
+          </p:cNvPr>
+          <p:cNvPicPr>
+            <a:picLocks noChangeAspect="1" noChangeArrowheads="1"/>
+          </p:cNvPicPr>
+          <p:nvPr/>
+        </p:nvPicPr>
+        <p:blipFill>
+          <a:blip r:embed="rId2">
+            <a:extLst>
+              <a:ext uri="{28A0092B-C50C-407E-A947-70E740481C1C}">
+                <a14:useLocalDpi xmlns:a14="http://schemas.microsoft.com/office/drawing/2010/main" val="0"/>
+              </a:ext>
+            </a:extLst>
+          </a:blip>
+          <a:srcRect/>
+          <a:stretch>
+            <a:fillRect/>
+          </a:stretch>
+        </p:blipFill>
+        <p:spPr bwMode="auto">
+          <a:xfrm>
+            <a:off x="136740" y="1929468"/>
+            <a:ext cx="11979479" cy="4198282"/>
+          </a:xfrm>
+          <a:prstGeom prst="rect">
+            <a:avLst/>
+          </a:prstGeom>
+          <a:noFill/>
+          <a:extLst>
+            <a:ext uri="{909E8E84-426E-40DD-AFC4-6F175D3DCCD1}">
+              <a14:hiddenFill xmlns:a14="http://schemas.microsoft.com/office/drawing/2010/main">
+                <a:solidFill>
+                  <a:srgbClr val="FFFFFF"/>
+                </a:solidFill>
+              </a14:hiddenFill>
+            </a:ext>
+          </a:extLst>
+        </p:spPr>
+      </p:pic>
+    </p:spTree>
+    <p:extLst>
+      <p:ext uri="{BB962C8B-B14F-4D97-AF65-F5344CB8AC3E}">
+        <p14:creationId xmlns:p14="http://schemas.microsoft.com/office/powerpoint/2010/main" val="1790691168"/>
+      </p:ext>
+    </p:extLst>
+  </p:cSld>
+  <p:clrMapOvr>
+    <a:masterClrMapping/>
+  </p:clrMapOvr>
+</p:sld>
+</file>
+
+<file path=ppt/slides/slide25.xml><?xml version="1.0" encoding="utf-8"?>
+<p:sld xmlns:a="http://schemas.openxmlformats.org/drawingml/2006/main" xmlns:r="http://schemas.openxmlformats.org/officeDocument/2006/relationships" xmlns:p="http://schemas.openxmlformats.org/presentationml/2006/main">
+  <p:cSld>
+    <p:spTree>
+      <p:nvGrpSpPr>
+        <p:cNvPr id="1" name=""/>
+        <p:cNvGrpSpPr/>
+        <p:nvPr/>
+      </p:nvGrpSpPr>
+      <p:grpSpPr>
+        <a:xfrm>
+          <a:off x="0" y="0"/>
+          <a:ext cx="0" cy="0"/>
+          <a:chOff x="0" y="0"/>
+          <a:chExt cx="0" cy="0"/>
+        </a:xfrm>
+      </p:grpSpPr>
+      <p:sp>
+        <p:nvSpPr>
+          <p:cNvPr id="2" name="Title 1">
+            <a:extLst>
+              <a:ext uri="{FF2B5EF4-FFF2-40B4-BE49-F238E27FC236}">
+                <a16:creationId xmlns:a16="http://schemas.microsoft.com/office/drawing/2014/main" id="{2EE5D0EA-2C09-70ED-DCB2-166E0AA65174}"/>
+              </a:ext>
+            </a:extLst>
+          </p:cNvPr>
+          <p:cNvSpPr>
+            <a:spLocks noGrp="1"/>
+          </p:cNvSpPr>
+          <p:nvPr>
+            <p:ph type="title"/>
+          </p:nvPr>
+        </p:nvSpPr>
+        <p:spPr/>
+        <p:txBody>
+          <a:bodyPr/>
+          <a:lstStyle/>
+          <a:p>
+            <a:r>
+              <a:rPr lang="en-US" sz="4000" dirty="0">
+                <a:solidFill>
+                  <a:srgbClr val="0070C0"/>
+                </a:solidFill>
+              </a:rPr>
+              <a:t>Multivariant Segmented Analysis</a:t>
+            </a:r>
+          </a:p>
+        </p:txBody>
+      </p:sp>
+      <p:pic>
+        <p:nvPicPr>
+          <p:cNvPr id="15362" name="Picture 2">
+            <a:extLst>
+              <a:ext uri="{FF2B5EF4-FFF2-40B4-BE49-F238E27FC236}">
+                <a16:creationId xmlns:a16="http://schemas.microsoft.com/office/drawing/2014/main" id="{AD1D7184-BC94-1E19-97DF-FC9E5D50AE58}"/>
+              </a:ext>
+            </a:extLst>
+          </p:cNvPr>
+          <p:cNvPicPr>
+            <a:picLocks noChangeAspect="1" noChangeArrowheads="1"/>
+          </p:cNvPicPr>
+          <p:nvPr/>
+        </p:nvPicPr>
+        <p:blipFill>
+          <a:blip r:embed="rId2">
+            <a:extLst>
+              <a:ext uri="{28A0092B-C50C-407E-A947-70E740481C1C}">
+                <a14:useLocalDpi xmlns:a14="http://schemas.microsoft.com/office/drawing/2010/main" val="0"/>
+              </a:ext>
+            </a:extLst>
+          </a:blip>
+          <a:srcRect/>
+          <a:stretch>
+            <a:fillRect/>
+          </a:stretch>
+        </p:blipFill>
+        <p:spPr bwMode="auto">
+          <a:xfrm>
+            <a:off x="977362" y="1842495"/>
+            <a:ext cx="10237275" cy="3527756"/>
+          </a:xfrm>
+          <a:prstGeom prst="rect">
+            <a:avLst/>
+          </a:prstGeom>
+          <a:noFill/>
+          <a:extLst>
+            <a:ext uri="{909E8E84-426E-40DD-AFC4-6F175D3DCCD1}">
+              <a14:hiddenFill xmlns:a14="http://schemas.microsoft.com/office/drawing/2010/main">
+                <a:solidFill>
+                  <a:srgbClr val="FFFFFF"/>
+                </a:solidFill>
+              </a14:hiddenFill>
+            </a:ext>
+          </a:extLst>
+        </p:spPr>
+      </p:pic>
+    </p:spTree>
+    <p:extLst>
+      <p:ext uri="{BB962C8B-B14F-4D97-AF65-F5344CB8AC3E}">
+        <p14:creationId xmlns:p14="http://schemas.microsoft.com/office/powerpoint/2010/main" val="4194310291"/>
+      </p:ext>
+    </p:extLst>
+  </p:cSld>
+  <p:clrMapOvr>
+    <a:masterClrMapping/>
+  </p:clrMapOvr>
+</p:sld>
+</file>
+
+<file path=ppt/slides/slide26.xml><?xml version="1.0" encoding="utf-8"?>
+<p:sld xmlns:a="http://schemas.openxmlformats.org/drawingml/2006/main" xmlns:r="http://schemas.openxmlformats.org/officeDocument/2006/relationships" xmlns:p="http://schemas.openxmlformats.org/presentationml/2006/main">
+  <p:cSld>
+    <p:spTree>
+      <p:nvGrpSpPr>
+        <p:cNvPr id="1" name=""/>
+        <p:cNvGrpSpPr/>
+        <p:nvPr/>
+      </p:nvGrpSpPr>
+      <p:grpSpPr>
+        <a:xfrm>
+          <a:off x="0" y="0"/>
+          <a:ext cx="0" cy="0"/>
+          <a:chOff x="0" y="0"/>
+          <a:chExt cx="0" cy="0"/>
+        </a:xfrm>
+      </p:grpSpPr>
+      <p:sp>
+        <p:nvSpPr>
+          <p:cNvPr id="2" name="Title 1">
+            <a:extLst>
+              <a:ext uri="{FF2B5EF4-FFF2-40B4-BE49-F238E27FC236}">
+                <a16:creationId xmlns:a16="http://schemas.microsoft.com/office/drawing/2014/main" id="{2EE5D0EA-2C09-70ED-DCB2-166E0AA65174}"/>
+              </a:ext>
+            </a:extLst>
+          </p:cNvPr>
+          <p:cNvSpPr>
+            <a:spLocks noGrp="1"/>
+          </p:cNvSpPr>
+          <p:nvPr>
+            <p:ph type="title"/>
+          </p:nvPr>
+        </p:nvSpPr>
+        <p:spPr/>
+        <p:txBody>
+          <a:bodyPr/>
+          <a:lstStyle/>
+          <a:p>
+            <a:r>
+              <a:rPr lang="en-US" sz="4000" dirty="0">
+                <a:solidFill>
+                  <a:srgbClr val="0070C0"/>
+                </a:solidFill>
+              </a:rPr>
+              <a:t>Multivariant Segmented Analysis</a:t>
+            </a:r>
+          </a:p>
+        </p:txBody>
+      </p:sp>
+      <p:pic>
+        <p:nvPicPr>
+          <p:cNvPr id="18434" name="Picture 2">
+            <a:extLst>
+              <a:ext uri="{FF2B5EF4-FFF2-40B4-BE49-F238E27FC236}">
+                <a16:creationId xmlns:a16="http://schemas.microsoft.com/office/drawing/2014/main" id="{8CEF3D4B-2567-4FEF-6B9E-247B188324E3}"/>
+              </a:ext>
+            </a:extLst>
+          </p:cNvPr>
+          <p:cNvPicPr>
+            <a:picLocks noChangeAspect="1" noChangeArrowheads="1"/>
+          </p:cNvPicPr>
+          <p:nvPr/>
+        </p:nvPicPr>
+        <p:blipFill>
+          <a:blip r:embed="rId2">
+            <a:extLst>
+              <a:ext uri="{28A0092B-C50C-407E-A947-70E740481C1C}">
+                <a14:useLocalDpi xmlns:a14="http://schemas.microsoft.com/office/drawing/2010/main" val="0"/>
+              </a:ext>
+            </a:extLst>
+          </a:blip>
+          <a:srcRect/>
+          <a:stretch>
+            <a:fillRect/>
+          </a:stretch>
+        </p:blipFill>
+        <p:spPr bwMode="auto">
+          <a:xfrm>
+            <a:off x="753331" y="1909582"/>
+            <a:ext cx="10402349" cy="3895600"/>
+          </a:xfrm>
+          <a:prstGeom prst="rect">
+            <a:avLst/>
+          </a:prstGeom>
+          <a:noFill/>
+          <a:extLst>
+            <a:ext uri="{909E8E84-426E-40DD-AFC4-6F175D3DCCD1}">
+              <a14:hiddenFill xmlns:a14="http://schemas.microsoft.com/office/drawing/2010/main">
+                <a:solidFill>
+                  <a:srgbClr val="FFFFFF"/>
+                </a:solidFill>
+              </a14:hiddenFill>
+            </a:ext>
+          </a:extLst>
+        </p:spPr>
+      </p:pic>
+    </p:spTree>
+    <p:extLst>
+      <p:ext uri="{BB962C8B-B14F-4D97-AF65-F5344CB8AC3E}">
+        <p14:creationId xmlns:p14="http://schemas.microsoft.com/office/powerpoint/2010/main" val="3222858783"/>
+      </p:ext>
+    </p:extLst>
+  </p:cSld>
+  <p:clrMapOvr>
+    <a:masterClrMapping/>
+  </p:clrMapOvr>
+</p:sld>
+</file>
+
+<file path=ppt/slides/slide27.xml><?xml version="1.0" encoding="utf-8"?>
+<p:sld xmlns:a="http://schemas.openxmlformats.org/drawingml/2006/main" xmlns:r="http://schemas.openxmlformats.org/officeDocument/2006/relationships" xmlns:p="http://schemas.openxmlformats.org/presentationml/2006/main">
+  <p:cSld>
+    <p:spTree>
+      <p:nvGrpSpPr>
+        <p:cNvPr id="1" name=""/>
+        <p:cNvGrpSpPr/>
+        <p:nvPr/>
+      </p:nvGrpSpPr>
+      <p:grpSpPr>
+        <a:xfrm>
+          <a:off x="0" y="0"/>
+          <a:ext cx="0" cy="0"/>
+          <a:chOff x="0" y="0"/>
+          <a:chExt cx="0" cy="0"/>
+        </a:xfrm>
+      </p:grpSpPr>
+      <p:sp>
+        <p:nvSpPr>
+          <p:cNvPr id="2" name="Title 1">
+            <a:extLst>
+              <a:ext uri="{FF2B5EF4-FFF2-40B4-BE49-F238E27FC236}">
+                <a16:creationId xmlns:a16="http://schemas.microsoft.com/office/drawing/2014/main" id="{2EE5D0EA-2C09-70ED-DCB2-166E0AA65174}"/>
+              </a:ext>
+            </a:extLst>
+          </p:cNvPr>
+          <p:cNvSpPr>
+            <a:spLocks noGrp="1"/>
+          </p:cNvSpPr>
+          <p:nvPr>
+            <p:ph type="title"/>
+          </p:nvPr>
+        </p:nvSpPr>
+        <p:spPr/>
+        <p:txBody>
+          <a:bodyPr/>
+          <a:lstStyle/>
+          <a:p>
+            <a:r>
+              <a:rPr lang="en-US" sz="4000" dirty="0">
+                <a:solidFill>
+                  <a:srgbClr val="0070C0"/>
+                </a:solidFill>
+              </a:rPr>
               <a:t>Correlation Analysis</a:t>
             </a:r>
           </a:p>
@@ -11040,7 +11495,7 @@
 </p:sld>
 </file>
 
-<file path=ppt/slides/slide25.xml><?xml version="1.0" encoding="utf-8"?>
+<file path=ppt/slides/slide28.xml><?xml version="1.0" encoding="utf-8"?>
 <p:sld xmlns:a="http://schemas.openxmlformats.org/drawingml/2006/main" xmlns:r="http://schemas.openxmlformats.org/officeDocument/2006/relationships" xmlns:p="http://schemas.openxmlformats.org/presentationml/2006/main">
   <p:cSld>
     <p:spTree>
@@ -11084,7 +11539,7 @@
                   <a:srgbClr val="0070C0"/>
                 </a:solidFill>
               </a:rPr>
-              <a:t>Suggestions</a:t>
+              <a:t>Conclusion</a:t>
             </a:r>
             <a:endParaRPr lang="en-US" dirty="0"/>
           </a:p>
@@ -11232,7 +11687,7 @@
 </p:sld>
 </file>
 
-<file path=ppt/slides/slide26.xml><?xml version="1.0" encoding="utf-8"?>
+<file path=ppt/slides/slide29.xml><?xml version="1.0" encoding="utf-8"?>
 <p:sld xmlns:a="http://schemas.openxmlformats.org/drawingml/2006/main" xmlns:r="http://schemas.openxmlformats.org/officeDocument/2006/relationships" xmlns:p="http://schemas.openxmlformats.org/presentationml/2006/main">
   <p:cSld>
     <p:spTree>
@@ -11271,7 +11726,7 @@
           <a:lstStyle/>
           <a:p>
             <a:r>
-              <a:rPr lang="en-US" sz="4400">
+              <a:rPr lang="en-US" sz="4400" dirty="0">
                 <a:solidFill>
                   <a:srgbClr val="0070C0"/>
                 </a:solidFill>
@@ -11676,75 +12131,6 @@
 </p:sld>
 </file>
 
-<file path=ppt/slides/slide27.xml><?xml version="1.0" encoding="utf-8"?>
-<p:sld xmlns:a="http://schemas.openxmlformats.org/drawingml/2006/main" xmlns:r="http://schemas.openxmlformats.org/officeDocument/2006/relationships" xmlns:p="http://schemas.openxmlformats.org/presentationml/2006/main">
-  <p:cSld>
-    <p:spTree>
-      <p:nvGrpSpPr>
-        <p:cNvPr id="1" name=""/>
-        <p:cNvGrpSpPr/>
-        <p:nvPr/>
-      </p:nvGrpSpPr>
-      <p:grpSpPr>
-        <a:xfrm>
-          <a:off x="0" y="0"/>
-          <a:ext cx="0" cy="0"/>
-          <a:chOff x="0" y="0"/>
-          <a:chExt cx="0" cy="0"/>
-        </a:xfrm>
-      </p:grpSpPr>
-      <p:sp>
-        <p:nvSpPr>
-          <p:cNvPr id="2" name="TextBox 1">
-            <a:extLst>
-              <a:ext uri="{FF2B5EF4-FFF2-40B4-BE49-F238E27FC236}">
-                <a16:creationId xmlns:a16="http://schemas.microsoft.com/office/drawing/2014/main" id="{917E5EB2-3034-F8B3-3645-3E8C3B15CDFE}"/>
-              </a:ext>
-            </a:extLst>
-          </p:cNvPr>
-          <p:cNvSpPr txBox="1"/>
-          <p:nvPr/>
-        </p:nvSpPr>
-        <p:spPr>
-          <a:xfrm>
-            <a:off x="3830463" y="2251427"/>
-            <a:ext cx="5583382" cy="923330"/>
-          </a:xfrm>
-          <a:prstGeom prst="rect">
-            <a:avLst/>
-          </a:prstGeom>
-          <a:noFill/>
-        </p:spPr>
-        <p:txBody>
-          <a:bodyPr wrap="square" rtlCol="0">
-            <a:spAutoFit/>
-          </a:bodyPr>
-          <a:lstStyle/>
-          <a:p>
-            <a:r>
-              <a:rPr lang="en-US" sz="5400" dirty="0">
-                <a:solidFill>
-                  <a:srgbClr val="002060"/>
-                </a:solidFill>
-              </a:rPr>
-              <a:t>Thank you</a:t>
-            </a:r>
-          </a:p>
-        </p:txBody>
-      </p:sp>
-    </p:spTree>
-    <p:extLst>
-      <p:ext uri="{BB962C8B-B14F-4D97-AF65-F5344CB8AC3E}">
-        <p14:creationId xmlns:p14="http://schemas.microsoft.com/office/powerpoint/2010/main" val="2706671381"/>
-      </p:ext>
-    </p:extLst>
-  </p:cSld>
-  <p:clrMapOvr>
-    <a:masterClrMapping/>
-  </p:clrMapOvr>
-</p:sld>
-</file>
-
 <file path=ppt/slides/slide3.xml><?xml version="1.0" encoding="utf-8"?>
 <p:sld xmlns:a="http://schemas.openxmlformats.org/drawingml/2006/main" xmlns:r="http://schemas.openxmlformats.org/officeDocument/2006/relationships" xmlns:p="http://schemas.openxmlformats.org/presentationml/2006/main">
   <p:cSld>
@@ -12015,7 +12401,7 @@
                 <a:ea typeface="Calibri" panose="020F0502020204030204" pitchFamily="34" charset="0"/>
                 <a:cs typeface="Calibri" panose="020F0502020204030204" pitchFamily="34" charset="0"/>
               </a:rPr>
-              <a:t>Suggestions</a:t>
+              <a:t>Conclusion</a:t>
             </a:r>
           </a:p>
         </p:txBody>
@@ -12240,6 +12626,16 @@
             </a:pPr>
             <a:r>
               <a:rPr lang="en-US" sz="1200" dirty="0"/>
+              <a:t>Multivariant Analysis</a:t>
+            </a:r>
+          </a:p>
+          <a:p>
+            <a:pPr marL="171450" indent="-171450">
+              <a:buFont typeface="Arial" panose="020B0604020202020204" pitchFamily="34" charset="0"/>
+              <a:buChar char="•"/>
+            </a:pPr>
+            <a:r>
+              <a:rPr lang="en-US" sz="1200" dirty="0"/>
               <a:t>Correlation Analysis</a:t>
             </a:r>
           </a:p>
@@ -12438,6 +12834,75 @@
     <p:extLst>
       <p:ext uri="{BB962C8B-B14F-4D97-AF65-F5344CB8AC3E}">
         <p14:creationId xmlns:p14="http://schemas.microsoft.com/office/powerpoint/2010/main" val="1396154371"/>
+      </p:ext>
+    </p:extLst>
+  </p:cSld>
+  <p:clrMapOvr>
+    <a:masterClrMapping/>
+  </p:clrMapOvr>
+</p:sld>
+</file>
+
+<file path=ppt/slides/slide30.xml><?xml version="1.0" encoding="utf-8"?>
+<p:sld xmlns:a="http://schemas.openxmlformats.org/drawingml/2006/main" xmlns:r="http://schemas.openxmlformats.org/officeDocument/2006/relationships" xmlns:p="http://schemas.openxmlformats.org/presentationml/2006/main">
+  <p:cSld>
+    <p:spTree>
+      <p:nvGrpSpPr>
+        <p:cNvPr id="1" name=""/>
+        <p:cNvGrpSpPr/>
+        <p:nvPr/>
+      </p:nvGrpSpPr>
+      <p:grpSpPr>
+        <a:xfrm>
+          <a:off x="0" y="0"/>
+          <a:ext cx="0" cy="0"/>
+          <a:chOff x="0" y="0"/>
+          <a:chExt cx="0" cy="0"/>
+        </a:xfrm>
+      </p:grpSpPr>
+      <p:sp>
+        <p:nvSpPr>
+          <p:cNvPr id="2" name="TextBox 1">
+            <a:extLst>
+              <a:ext uri="{FF2B5EF4-FFF2-40B4-BE49-F238E27FC236}">
+                <a16:creationId xmlns:a16="http://schemas.microsoft.com/office/drawing/2014/main" id="{917E5EB2-3034-F8B3-3645-3E8C3B15CDFE}"/>
+              </a:ext>
+            </a:extLst>
+          </p:cNvPr>
+          <p:cNvSpPr txBox="1"/>
+          <p:nvPr/>
+        </p:nvSpPr>
+        <p:spPr>
+          <a:xfrm>
+            <a:off x="3830463" y="2251427"/>
+            <a:ext cx="5583382" cy="923330"/>
+          </a:xfrm>
+          <a:prstGeom prst="rect">
+            <a:avLst/>
+          </a:prstGeom>
+          <a:noFill/>
+        </p:spPr>
+        <p:txBody>
+          <a:bodyPr wrap="square" rtlCol="0">
+            <a:spAutoFit/>
+          </a:bodyPr>
+          <a:lstStyle/>
+          <a:p>
+            <a:r>
+              <a:rPr lang="en-US" sz="5400" dirty="0">
+                <a:solidFill>
+                  <a:srgbClr val="002060"/>
+                </a:solidFill>
+              </a:rPr>
+              <a:t>Thank you</a:t>
+            </a:r>
+          </a:p>
+        </p:txBody>
+      </p:sp>
+    </p:spTree>
+    <p:extLst>
+      <p:ext uri="{BB962C8B-B14F-4D97-AF65-F5344CB8AC3E}">
+        <p14:creationId xmlns:p14="http://schemas.microsoft.com/office/powerpoint/2010/main" val="2706671381"/>
       </p:ext>
     </p:extLst>
   </p:cSld>

</xml_diff>